<commit_message>
nit in draft name
</commit_message>
<xml_diff>
--- a/117/NETCONF/draft-ietf-netconf-yang-notifications-versioning-01.pptx
+++ b/117/NETCONF/draft-ietf-netconf-yang-notifications-versioning-01.pptx
@@ -119,6 +119,80 @@
 </p:presentation>
 </file>
 
+<file path=ppt/changesInfos/changesInfo1.xml><?xml version="1.0" encoding="utf-8"?>
+<pc:chgInfo xmlns:a="http://schemas.openxmlformats.org/drawingml/2006/main" xmlns:r="http://schemas.openxmlformats.org/officeDocument/2006/relationships" xmlns:ac="http://schemas.microsoft.com/office/drawing/2013/main/command" xmlns:pc="http://schemas.microsoft.com/office/powerpoint/2013/main/command">
+  <pc:docChgLst>
+    <pc:chgData name="Graf Thomas, INI-NET-VNC-HCS" userId="487bc3e3-9ce7-4cdd-b7b4-8899ea88d289" providerId="ADAL" clId="{8DF96A96-69BF-4E44-98F8-20C076905C50}"/>
+    <pc:docChg chg="modSld">
+      <pc:chgData name="Graf Thomas, INI-NET-VNC-HCS" userId="487bc3e3-9ce7-4cdd-b7b4-8899ea88d289" providerId="ADAL" clId="{8DF96A96-69BF-4E44-98F8-20C076905C50}" dt="2023-07-15T06:44:17.864" v="13" actId="20577"/>
+      <pc:docMkLst>
+        <pc:docMk/>
+      </pc:docMkLst>
+      <pc:sldChg chg="modSp mod">
+        <pc:chgData name="Graf Thomas, INI-NET-VNC-HCS" userId="487bc3e3-9ce7-4cdd-b7b4-8899ea88d289" providerId="ADAL" clId="{8DF96A96-69BF-4E44-98F8-20C076905C50}" dt="2023-07-15T06:43:44.218" v="2" actId="20577"/>
+        <pc:sldMkLst>
+          <pc:docMk/>
+          <pc:sldMk cId="3578665336" sldId="1041"/>
+        </pc:sldMkLst>
+        <pc:spChg chg="mod">
+          <ac:chgData name="Graf Thomas, INI-NET-VNC-HCS" userId="487bc3e3-9ce7-4cdd-b7b4-8899ea88d289" providerId="ADAL" clId="{8DF96A96-69BF-4E44-98F8-20C076905C50}" dt="2023-07-15T06:43:44.218" v="2" actId="20577"/>
+          <ac:spMkLst>
+            <pc:docMk/>
+            <pc:sldMk cId="3578665336" sldId="1041"/>
+            <ac:spMk id="6" creationId="{6CAA0765-1318-4A03-8F91-D3ECC43D8FA7}"/>
+          </ac:spMkLst>
+        </pc:spChg>
+      </pc:sldChg>
+      <pc:sldChg chg="modSp mod">
+        <pc:chgData name="Graf Thomas, INI-NET-VNC-HCS" userId="487bc3e3-9ce7-4cdd-b7b4-8899ea88d289" providerId="ADAL" clId="{8DF96A96-69BF-4E44-98F8-20C076905C50}" dt="2023-07-15T06:43:54.099" v="9" actId="20577"/>
+        <pc:sldMkLst>
+          <pc:docMk/>
+          <pc:sldMk cId="320697580" sldId="26425"/>
+        </pc:sldMkLst>
+        <pc:spChg chg="mod">
+          <ac:chgData name="Graf Thomas, INI-NET-VNC-HCS" userId="487bc3e3-9ce7-4cdd-b7b4-8899ea88d289" providerId="ADAL" clId="{8DF96A96-69BF-4E44-98F8-20C076905C50}" dt="2023-07-15T06:43:54.099" v="9" actId="20577"/>
+          <ac:spMkLst>
+            <pc:docMk/>
+            <pc:sldMk cId="320697580" sldId="26425"/>
+            <ac:spMk id="3" creationId="{29C0DFD4-432D-4B0C-93DF-790441DCF5B9}"/>
+          </ac:spMkLst>
+        </pc:spChg>
+      </pc:sldChg>
+      <pc:sldChg chg="modSp mod">
+        <pc:chgData name="Graf Thomas, INI-NET-VNC-HCS" userId="487bc3e3-9ce7-4cdd-b7b4-8899ea88d289" providerId="ADAL" clId="{8DF96A96-69BF-4E44-98F8-20C076905C50}" dt="2023-07-15T06:44:17.864" v="13" actId="20577"/>
+        <pc:sldMkLst>
+          <pc:docMk/>
+          <pc:sldMk cId="3188824003" sldId="2145706227"/>
+        </pc:sldMkLst>
+        <pc:spChg chg="mod">
+          <ac:chgData name="Graf Thomas, INI-NET-VNC-HCS" userId="487bc3e3-9ce7-4cdd-b7b4-8899ea88d289" providerId="ADAL" clId="{8DF96A96-69BF-4E44-98F8-20C076905C50}" dt="2023-07-15T06:44:17.864" v="13" actId="20577"/>
+          <ac:spMkLst>
+            <pc:docMk/>
+            <pc:sldMk cId="3188824003" sldId="2145706227"/>
+            <ac:spMk id="4" creationId="{B96F8F06-524F-4D7C-89FB-72456175BADD}"/>
+          </ac:spMkLst>
+        </pc:spChg>
+      </pc:sldChg>
+      <pc:sldChg chg="modSp mod">
+        <pc:chgData name="Graf Thomas, INI-NET-VNC-HCS" userId="487bc3e3-9ce7-4cdd-b7b4-8899ea88d289" providerId="ADAL" clId="{8DF96A96-69BF-4E44-98F8-20C076905C50}" dt="2023-07-15T06:43:49.686" v="5" actId="20577"/>
+        <pc:sldMkLst>
+          <pc:docMk/>
+          <pc:sldMk cId="505743577" sldId="2145706228"/>
+        </pc:sldMkLst>
+        <pc:spChg chg="mod">
+          <ac:chgData name="Graf Thomas, INI-NET-VNC-HCS" userId="487bc3e3-9ce7-4cdd-b7b4-8899ea88d289" providerId="ADAL" clId="{8DF96A96-69BF-4E44-98F8-20C076905C50}" dt="2023-07-15T06:43:49.686" v="5" actId="20577"/>
+          <ac:spMkLst>
+            <pc:docMk/>
+            <pc:sldMk cId="505743577" sldId="2145706228"/>
+            <ac:spMk id="6" creationId="{7C3B84B0-CEE6-9508-972D-6095E0E01E98}"/>
+          </ac:spMkLst>
+        </pc:spChg>
+      </pc:sldChg>
+    </pc:docChg>
+  </pc:docChgLst>
+</pc:chgInfo>
+</file>
+
 <file path=ppt/notesMasters/notesMaster1.xml><?xml version="1.0" encoding="utf-8"?>
 <p:notesMaster xmlns:a="http://schemas.openxmlformats.org/drawingml/2006/main" xmlns:r="http://schemas.openxmlformats.org/officeDocument/2006/relationships" xmlns:p="http://schemas.openxmlformats.org/presentationml/2006/main">
   <p:cSld>
@@ -201,7 +275,7 @@
           <a:p>
             <a:fld id="{E5E705E9-673F-4AC4-B29E-A7B26F3B8523}" type="datetimeFigureOut">
               <a:rPr lang="de-CH" smtClean="0"/>
-              <a:t>06.07.2023</a:t>
+              <a:t>15.07.2023</a:t>
             </a:fld>
             <a:endParaRPr lang="de-CH"/>
           </a:p>
@@ -702,7 +776,7 @@
           <a:p>
             <a:fld id="{9E9B238C-2335-4007-98C9-471C02CC43B6}" type="datetimeFigureOut">
               <a:rPr lang="de-CH" smtClean="0"/>
-              <a:t>06.07.2023</a:t>
+              <a:t>15.07.2023</a:t>
             </a:fld>
             <a:endParaRPr lang="de-CH"/>
           </a:p>
@@ -902,7 +976,7 @@
           <a:p>
             <a:fld id="{9E9B238C-2335-4007-98C9-471C02CC43B6}" type="datetimeFigureOut">
               <a:rPr lang="de-CH" smtClean="0"/>
-              <a:t>06.07.2023</a:t>
+              <a:t>15.07.2023</a:t>
             </a:fld>
             <a:endParaRPr lang="de-CH"/>
           </a:p>
@@ -1112,7 +1186,7 @@
           <a:p>
             <a:fld id="{9E9B238C-2335-4007-98C9-471C02CC43B6}" type="datetimeFigureOut">
               <a:rPr lang="de-CH" smtClean="0"/>
-              <a:t>06.07.2023</a:t>
+              <a:t>15.07.2023</a:t>
             </a:fld>
             <a:endParaRPr lang="de-CH"/>
           </a:p>
@@ -1541,7 +1615,7 @@
           <a:p>
             <a:fld id="{9E9B238C-2335-4007-98C9-471C02CC43B6}" type="datetimeFigureOut">
               <a:rPr lang="de-CH" smtClean="0"/>
-              <a:t>06.07.2023</a:t>
+              <a:t>15.07.2023</a:t>
             </a:fld>
             <a:endParaRPr lang="de-CH"/>
           </a:p>
@@ -1817,7 +1891,7 @@
           <a:p>
             <a:fld id="{9E9B238C-2335-4007-98C9-471C02CC43B6}" type="datetimeFigureOut">
               <a:rPr lang="de-CH" smtClean="0"/>
-              <a:t>06.07.2023</a:t>
+              <a:t>15.07.2023</a:t>
             </a:fld>
             <a:endParaRPr lang="de-CH"/>
           </a:p>
@@ -2085,7 +2159,7 @@
           <a:p>
             <a:fld id="{9E9B238C-2335-4007-98C9-471C02CC43B6}" type="datetimeFigureOut">
               <a:rPr lang="de-CH" smtClean="0"/>
-              <a:t>06.07.2023</a:t>
+              <a:t>15.07.2023</a:t>
             </a:fld>
             <a:endParaRPr lang="de-CH"/>
           </a:p>
@@ -2500,7 +2574,7 @@
           <a:p>
             <a:fld id="{9E9B238C-2335-4007-98C9-471C02CC43B6}" type="datetimeFigureOut">
               <a:rPr lang="de-CH" smtClean="0"/>
-              <a:t>06.07.2023</a:t>
+              <a:t>15.07.2023</a:t>
             </a:fld>
             <a:endParaRPr lang="de-CH"/>
           </a:p>
@@ -2642,7 +2716,7 @@
           <a:p>
             <a:fld id="{9E9B238C-2335-4007-98C9-471C02CC43B6}" type="datetimeFigureOut">
               <a:rPr lang="de-CH" smtClean="0"/>
-              <a:t>06.07.2023</a:t>
+              <a:t>15.07.2023</a:t>
             </a:fld>
             <a:endParaRPr lang="de-CH"/>
           </a:p>
@@ -2755,7 +2829,7 @@
           <a:p>
             <a:fld id="{9E9B238C-2335-4007-98C9-471C02CC43B6}" type="datetimeFigureOut">
               <a:rPr lang="de-CH" smtClean="0"/>
-              <a:t>06.07.2023</a:t>
+              <a:t>15.07.2023</a:t>
             </a:fld>
             <a:endParaRPr lang="de-CH"/>
           </a:p>
@@ -3068,7 +3142,7 @@
           <a:p>
             <a:fld id="{9E9B238C-2335-4007-98C9-471C02CC43B6}" type="datetimeFigureOut">
               <a:rPr lang="de-CH" smtClean="0"/>
-              <a:t>06.07.2023</a:t>
+              <a:t>15.07.2023</a:t>
             </a:fld>
             <a:endParaRPr lang="de-CH"/>
           </a:p>
@@ -3357,7 +3431,7 @@
           <a:p>
             <a:fld id="{9E9B238C-2335-4007-98C9-471C02CC43B6}" type="datetimeFigureOut">
               <a:rPr lang="de-CH" smtClean="0"/>
-              <a:t>06.07.2023</a:t>
+              <a:t>15.07.2023</a:t>
             </a:fld>
             <a:endParaRPr lang="de-CH"/>
           </a:p>
@@ -3600,7 +3674,7 @@
           <a:p>
             <a:fld id="{9E9B238C-2335-4007-98C9-471C02CC43B6}" type="datetimeFigureOut">
               <a:rPr lang="de-CH" smtClean="0"/>
-              <a:t>06.07.2023</a:t>
+              <a:t>15.07.2023</a:t>
             </a:fld>
             <a:endParaRPr lang="de-CH"/>
           </a:p>
@@ -4402,7 +4476,7 @@
               <a:rPr lang="de-CH" sz="3800" dirty="0">
                 <a:latin typeface="+mj-lt"/>
               </a:rPr>
-              <a:t>6. </a:t>
+              <a:t>15. </a:t>
             </a:r>
             <a:r>
               <a:rPr lang="de-CH" sz="3800" dirty="0" err="1">
@@ -4933,7 +5007,7 @@
               <a:rPr lang="de-CH" sz="3800" dirty="0">
                 <a:latin typeface="+mj-lt"/>
               </a:rPr>
-              <a:t>6. </a:t>
+              <a:t>15. </a:t>
             </a:r>
             <a:r>
               <a:rPr lang="de-CH" sz="3800" dirty="0" err="1">
@@ -6438,7 +6512,7 @@
                   <a:srgbClr val="FF0000"/>
                 </a:solidFill>
               </a:rPr>
-              <a:t>tgraf</a:t>
+              <a:t>ietf</a:t>
             </a:r>
             <a:r>
               <a:rPr lang="en-US" sz="1800" b="1" dirty="0">
@@ -6446,23 +6520,7 @@
                   <a:srgbClr val="FF0000"/>
                 </a:solidFill>
               </a:rPr>
-              <a:t>-</a:t>
-            </a:r>
-            <a:r>
-              <a:rPr lang="en-US" sz="1800" b="1" dirty="0" err="1">
-                <a:solidFill>
-                  <a:srgbClr val="FF0000"/>
-                </a:solidFill>
-              </a:rPr>
-              <a:t>netconf</a:t>
-            </a:r>
-            <a:r>
-              <a:rPr lang="en-US" sz="1800" b="1" dirty="0">
-                <a:solidFill>
-                  <a:srgbClr val="FF0000"/>
-                </a:solidFill>
-              </a:rPr>
-              <a:t>-yang-notifications-versioning</a:t>
+              <a:t>-netconf-yang-notifications-versioning</a:t>
             </a:r>
             <a:r>
               <a:rPr lang="en-US" sz="1800" dirty="0"/>
@@ -7734,7 +7792,7 @@
                   <a:srgbClr val="FF0000"/>
                 </a:solidFill>
               </a:rPr>
-              <a:t>tgraf</a:t>
+              <a:t>ietf</a:t>
             </a:r>
             <a:r>
               <a:rPr lang="en-US" sz="1600" dirty="0">

</xml_diff>